<commit_message>
Fail fast, fail safe and Split Iterator
</commit_message>
<xml_diff>
--- a/Java8.pptx
+++ b/Java8.pptx
@@ -14,7 +14,11 @@
     <p:sldId id="301" r:id="rId8"/>
     <p:sldId id="302" r:id="rId9"/>
     <p:sldId id="304" r:id="rId10"/>
-    <p:sldId id="269" r:id="rId11"/>
+    <p:sldId id="307" r:id="rId11"/>
+    <p:sldId id="308" r:id="rId12"/>
+    <p:sldId id="309" r:id="rId13"/>
+    <p:sldId id="306" r:id="rId14"/>
+    <p:sldId id="269" r:id="rId15"/>
   </p:sldIdLst>
   <p:sldSz cx="9144000" cy="6858000" type="screen4x3"/>
   <p:notesSz cx="6858000" cy="9144000"/>
@@ -304,7 +308,7 @@
           <a:p>
             <a:fld id="{8F235549-BF0A-4B98-8561-3786244E808C}" type="datetimeFigureOut">
               <a:rPr lang="en-US" smtClean="0"/>
-              <a:t>4/4/2016</a:t>
+              <a:t>4/28/2017</a:t>
             </a:fld>
             <a:endParaRPr lang="en-US"/>
           </a:p>
@@ -504,7 +508,7 @@
           <a:p>
             <a:fld id="{8F235549-BF0A-4B98-8561-3786244E808C}" type="datetimeFigureOut">
               <a:rPr lang="en-US" smtClean="0"/>
-              <a:t>4/4/2016</a:t>
+              <a:t>4/28/2017</a:t>
             </a:fld>
             <a:endParaRPr lang="en-US"/>
           </a:p>
@@ -679,7 +683,7 @@
           <a:p>
             <a:fld id="{8F235549-BF0A-4B98-8561-3786244E808C}" type="datetimeFigureOut">
               <a:rPr lang="en-US" smtClean="0"/>
-              <a:t>4/4/2016</a:t>
+              <a:t>4/28/2017</a:t>
             </a:fld>
             <a:endParaRPr lang="en-US"/>
           </a:p>
@@ -844,7 +848,7 @@
           <a:p>
             <a:fld id="{8F235549-BF0A-4B98-8561-3786244E808C}" type="datetimeFigureOut">
               <a:rPr lang="en-US" smtClean="0"/>
-              <a:t>4/4/2016</a:t>
+              <a:t>4/28/2017</a:t>
             </a:fld>
             <a:endParaRPr lang="en-US"/>
           </a:p>
@@ -1092,7 +1096,7 @@
           <a:p>
             <a:fld id="{8F235549-BF0A-4B98-8561-3786244E808C}" type="datetimeFigureOut">
               <a:rPr lang="en-US" smtClean="0"/>
-              <a:t>4/4/2016</a:t>
+              <a:t>4/28/2017</a:t>
             </a:fld>
             <a:endParaRPr lang="en-US"/>
           </a:p>
@@ -1410,7 +1414,7 @@
           <a:p>
             <a:fld id="{8F235549-BF0A-4B98-8561-3786244E808C}" type="datetimeFigureOut">
               <a:rPr lang="en-US" smtClean="0"/>
-              <a:t>4/4/2016</a:t>
+              <a:t>4/28/2017</a:t>
             </a:fld>
             <a:endParaRPr lang="en-US"/>
           </a:p>
@@ -1876,7 +1880,7 @@
           <a:p>
             <a:fld id="{8F235549-BF0A-4B98-8561-3786244E808C}" type="datetimeFigureOut">
               <a:rPr lang="en-US" smtClean="0"/>
-              <a:t>4/4/2016</a:t>
+              <a:t>4/28/2017</a:t>
             </a:fld>
             <a:endParaRPr lang="en-US"/>
           </a:p>
@@ -2024,7 +2028,7 @@
           <a:p>
             <a:fld id="{8F235549-BF0A-4B98-8561-3786244E808C}" type="datetimeFigureOut">
               <a:rPr lang="en-US" smtClean="0"/>
-              <a:t>4/4/2016</a:t>
+              <a:t>4/28/2017</a:t>
             </a:fld>
             <a:endParaRPr lang="en-US"/>
           </a:p>
@@ -2114,7 +2118,7 @@
           <a:p>
             <a:fld id="{8F235549-BF0A-4B98-8561-3786244E808C}" type="datetimeFigureOut">
               <a:rPr lang="en-US" smtClean="0"/>
-              <a:t>4/4/2016</a:t>
+              <a:t>4/28/2017</a:t>
             </a:fld>
             <a:endParaRPr lang="en-US"/>
           </a:p>
@@ -2388,7 +2392,7 @@
           <a:p>
             <a:fld id="{8F235549-BF0A-4B98-8561-3786244E808C}" type="datetimeFigureOut">
               <a:rPr lang="en-US" smtClean="0"/>
-              <a:t>4/4/2016</a:t>
+              <a:t>4/28/2017</a:t>
             </a:fld>
             <a:endParaRPr lang="en-US"/>
           </a:p>
@@ -2693,7 +2697,7 @@
           <a:p>
             <a:fld id="{8F235549-BF0A-4B98-8561-3786244E808C}" type="datetimeFigureOut">
               <a:rPr lang="en-US" smtClean="0"/>
-              <a:t>4/4/2016</a:t>
+              <a:t>4/28/2017</a:t>
             </a:fld>
             <a:endParaRPr lang="en-US"/>
           </a:p>
@@ -2991,7 +2995,7 @@
           <a:p>
             <a:fld id="{8F235549-BF0A-4B98-8561-3786244E808C}" type="datetimeFigureOut">
               <a:rPr lang="en-US" smtClean="0"/>
-              <a:t>4/4/2016</a:t>
+              <a:t>4/28/2017</a:t>
             </a:fld>
             <a:endParaRPr lang="en-US"/>
           </a:p>
@@ -3460,6 +3464,705 @@
         </p:nvSpPr>
         <p:spPr/>
         <p:txBody>
+          <a:bodyPr>
+            <a:normAutofit/>
+          </a:bodyPr>
+          <a:lstStyle/>
+          <a:p>
+            <a:r>
+              <a:rPr lang="en-US" dirty="0" smtClean="0"/>
+              <a:t>Fail Safe Iterator</a:t>
+            </a:r>
+            <a:endParaRPr lang="en-US" dirty="0"/>
+          </a:p>
+        </p:txBody>
+      </p:sp>
+      <p:sp>
+        <p:nvSpPr>
+          <p:cNvPr id="3" name="Content Placeholder 2"/>
+          <p:cNvSpPr>
+            <a:spLocks noGrp="1"/>
+          </p:cNvSpPr>
+          <p:nvPr>
+            <p:ph idx="1"/>
+          </p:nvPr>
+        </p:nvSpPr>
+        <p:spPr/>
+        <p:txBody>
+          <a:bodyPr>
+            <a:normAutofit/>
+          </a:bodyPr>
+          <a:lstStyle/>
+          <a:p>
+            <a:r>
+              <a:rPr lang="en-GB" sz="1600" dirty="0"/>
+              <a:t>Fail Safe Iterator makes copy of the internal data structure (object array) and iterates over the copied data structure</a:t>
+            </a:r>
+            <a:r>
+              <a:rPr lang="en-GB" sz="1600" dirty="0" smtClean="0"/>
+              <a:t>. Any </a:t>
+            </a:r>
+            <a:r>
+              <a:rPr lang="en-GB" sz="1600" dirty="0"/>
+              <a:t>structural modification done to the iterator affects the copied data structure.  So , original data structure remains  structurally </a:t>
+            </a:r>
+            <a:r>
+              <a:rPr lang="en-GB" sz="1600" dirty="0" smtClean="0"/>
+              <a:t>unchanged. Hence </a:t>
+            </a:r>
+            <a:r>
+              <a:rPr lang="en-GB" sz="1600" dirty="0"/>
+              <a:t>, no ConcurrentModificationException throws by the fail safe iterator.</a:t>
+            </a:r>
+            <a:r>
+              <a:rPr lang="en-GB" sz="1600" dirty="0"/>
+              <a:t/>
+            </a:r>
+            <a:br>
+              <a:rPr lang="en-GB" sz="1600" dirty="0"/>
+            </a:br>
+            <a:r>
+              <a:rPr lang="en-GB" sz="1600" dirty="0"/>
+              <a:t/>
+            </a:r>
+            <a:br>
+              <a:rPr lang="en-GB" sz="1600" dirty="0"/>
+            </a:br>
+            <a:r>
+              <a:rPr lang="en-GB" sz="1600" dirty="0"/>
+              <a:t>Two  issues associated with Fail Safe Iterator are :</a:t>
+            </a:r>
+            <a:r>
+              <a:rPr lang="en-GB" sz="1600" dirty="0"/>
+              <a:t/>
+            </a:r>
+            <a:br>
+              <a:rPr lang="en-GB" sz="1600" dirty="0"/>
+            </a:br>
+            <a:r>
+              <a:rPr lang="en-GB" sz="1600" dirty="0"/>
+              <a:t/>
+            </a:r>
+            <a:br>
+              <a:rPr lang="en-GB" sz="1600" dirty="0"/>
+            </a:br>
+            <a:r>
+              <a:rPr lang="en-GB" sz="1600" dirty="0"/>
+              <a:t>1. Overhead of maintaining the copied data structure </a:t>
+            </a:r>
+            <a:r>
+              <a:rPr lang="en-GB" sz="1600" dirty="0" smtClean="0"/>
+              <a:t>i.e. </a:t>
+            </a:r>
+            <a:r>
+              <a:rPr lang="en-GB" sz="1600" dirty="0"/>
+              <a:t>memory.</a:t>
+            </a:r>
+            <a:r>
+              <a:rPr lang="en-GB" sz="1600" dirty="0"/>
+              <a:t/>
+            </a:r>
+            <a:br>
+              <a:rPr lang="en-GB" sz="1600" dirty="0"/>
+            </a:br>
+            <a:r>
+              <a:rPr lang="en-GB" sz="1600" dirty="0"/>
+              <a:t/>
+            </a:r>
+            <a:br>
+              <a:rPr lang="en-GB" sz="1600" dirty="0"/>
+            </a:br>
+            <a:r>
+              <a:rPr lang="en-GB" sz="1600" dirty="0"/>
+              <a:t>2.  Fail safe iterator does not guarantee that the data being read is the data currently in the original data structure. </a:t>
+            </a:r>
+            <a:endParaRPr lang="en-GB" sz="1600" dirty="0"/>
+          </a:p>
+        </p:txBody>
+      </p:sp>
+    </p:spTree>
+    <p:extLst>
+      <p:ext uri="{BB962C8B-B14F-4D97-AF65-F5344CB8AC3E}">
+        <p14:creationId xmlns:p14="http://schemas.microsoft.com/office/powerpoint/2010/main" val="106794999"/>
+      </p:ext>
+    </p:extLst>
+  </p:cSld>
+  <p:clrMapOvr>
+    <a:masterClrMapping/>
+  </p:clrMapOvr>
+  <p:timing>
+    <p:tnLst>
+      <p:par>
+        <p:cTn id="1" dur="indefinite" restart="never" nodeType="tmRoot"/>
+      </p:par>
+    </p:tnLst>
+  </p:timing>
+</p:sld>
+</file>
+
+<file path=ppt/slides/slide11.xml><?xml version="1.0" encoding="utf-8"?>
+<p:sld xmlns:a="http://schemas.openxmlformats.org/drawingml/2006/main" xmlns:r="http://schemas.openxmlformats.org/officeDocument/2006/relationships" xmlns:p="http://schemas.openxmlformats.org/presentationml/2006/main">
+  <p:cSld>
+    <p:spTree>
+      <p:nvGrpSpPr>
+        <p:cNvPr id="1" name=""/>
+        <p:cNvGrpSpPr/>
+        <p:nvPr/>
+      </p:nvGrpSpPr>
+      <p:grpSpPr>
+        <a:xfrm>
+          <a:off x="0" y="0"/>
+          <a:ext cx="0" cy="0"/>
+          <a:chOff x="0" y="0"/>
+          <a:chExt cx="0" cy="0"/>
+        </a:xfrm>
+      </p:grpSpPr>
+      <p:sp>
+        <p:nvSpPr>
+          <p:cNvPr id="2" name="Title 1"/>
+          <p:cNvSpPr>
+            <a:spLocks noGrp="1"/>
+          </p:cNvSpPr>
+          <p:nvPr>
+            <p:ph type="title"/>
+          </p:nvPr>
+        </p:nvSpPr>
+        <p:spPr/>
+        <p:txBody>
+          <a:bodyPr>
+            <a:normAutofit fontScale="90000"/>
+          </a:bodyPr>
+          <a:lstStyle/>
+          <a:p>
+            <a:r>
+              <a:rPr lang="en-US" dirty="0" smtClean="0"/>
+              <a:t>Multi-core processor – Parallel Stream</a:t>
+            </a:r>
+            <a:endParaRPr lang="en-US" dirty="0"/>
+          </a:p>
+        </p:txBody>
+      </p:sp>
+      <p:sp>
+        <p:nvSpPr>
+          <p:cNvPr id="3" name="Content Placeholder 2"/>
+          <p:cNvSpPr>
+            <a:spLocks noGrp="1"/>
+          </p:cNvSpPr>
+          <p:nvPr>
+            <p:ph idx="1"/>
+          </p:nvPr>
+        </p:nvSpPr>
+        <p:spPr/>
+        <p:txBody>
+          <a:bodyPr>
+            <a:normAutofit/>
+          </a:bodyPr>
+          <a:lstStyle/>
+          <a:p>
+            <a:r>
+              <a:rPr lang="en-GB" sz="1600" dirty="0"/>
+              <a:t>A </a:t>
+            </a:r>
+            <a:r>
+              <a:rPr lang="en-GB" sz="1600" b="1" i="1" dirty="0"/>
+              <a:t>parallel</a:t>
+            </a:r>
+            <a:r>
+              <a:rPr lang="en-GB" sz="1600" b="1" dirty="0"/>
+              <a:t> stream</a:t>
+            </a:r>
+            <a:r>
+              <a:rPr lang="en-GB" sz="1600" dirty="0"/>
+              <a:t> is a stream that splits its elements into multiple chunks, processing each chunk with a different thread. Thus, you can automatically partition the workload of a given operation on all the cores of your </a:t>
+            </a:r>
+            <a:r>
+              <a:rPr lang="en-GB" sz="1600" b="1" dirty="0"/>
+              <a:t>multicore processor </a:t>
+            </a:r>
+            <a:r>
+              <a:rPr lang="en-GB" sz="1600" dirty="0"/>
+              <a:t>and keep all of them equally </a:t>
+            </a:r>
+            <a:r>
+              <a:rPr lang="en-GB" sz="1600" dirty="0" smtClean="0"/>
+              <a:t>busy</a:t>
+            </a:r>
+            <a:endParaRPr lang="en-GB" sz="1600" dirty="0"/>
+          </a:p>
+          <a:p>
+            <a:r>
+              <a:rPr lang="en-GB" sz="1600" dirty="0" smtClean="0"/>
+              <a:t>It is observed that parallel stream on </a:t>
+            </a:r>
+            <a:r>
+              <a:rPr lang="en-GB" sz="1600" b="1" dirty="0" err="1" smtClean="0"/>
+              <a:t>LinkedList</a:t>
+            </a:r>
+            <a:r>
+              <a:rPr lang="en-GB" sz="1600" dirty="0" smtClean="0"/>
+              <a:t> and </a:t>
+            </a:r>
+            <a:r>
+              <a:rPr lang="en-GB" sz="1600" b="1" dirty="0" err="1" smtClean="0"/>
+              <a:t>Stream.iterate</a:t>
+            </a:r>
+            <a:r>
+              <a:rPr lang="en-GB" sz="1600" dirty="0" smtClean="0"/>
+              <a:t> seem to produce </a:t>
+            </a:r>
+            <a:r>
+              <a:rPr lang="en-GB" sz="1600" b="1" dirty="0" smtClean="0">
+                <a:solidFill>
+                  <a:srgbClr val="FF0000"/>
+                </a:solidFill>
+              </a:rPr>
+              <a:t>Poor</a:t>
+            </a:r>
+            <a:r>
+              <a:rPr lang="en-GB" sz="1600" dirty="0" smtClean="0"/>
+              <a:t> performance</a:t>
+            </a:r>
+          </a:p>
+          <a:p>
+            <a:r>
+              <a:rPr lang="en-GB" sz="1600" dirty="0"/>
+              <a:t>Parallel streams internally use the default </a:t>
+            </a:r>
+            <a:r>
+              <a:rPr lang="en-GB" sz="1600" b="1" dirty="0" err="1" smtClean="0"/>
+              <a:t>ForkJoinPool</a:t>
+            </a:r>
+            <a:r>
+              <a:rPr lang="en-GB" sz="1600" b="1" dirty="0" smtClean="0"/>
+              <a:t> </a:t>
+            </a:r>
+            <a:r>
+              <a:rPr lang="en-GB" sz="1600" dirty="0"/>
+              <a:t>which by default has as many threads as you have processors, as returned by </a:t>
+            </a:r>
+            <a:r>
+              <a:rPr lang="en-GB" sz="1600" dirty="0" err="1"/>
+              <a:t>Runtime.getRuntime</a:t>
+            </a:r>
+            <a:r>
+              <a:rPr lang="en-GB" sz="1600" dirty="0"/>
+              <a:t>().</a:t>
+            </a:r>
+            <a:r>
+              <a:rPr lang="en-GB" sz="1600" dirty="0" err="1"/>
+              <a:t>availableProcessors</a:t>
+            </a:r>
+            <a:r>
+              <a:rPr lang="en-GB" sz="1600" dirty="0" smtClean="0"/>
+              <a:t>().</a:t>
+            </a:r>
+          </a:p>
+          <a:p>
+            <a:r>
+              <a:rPr lang="en-GB" sz="1600" dirty="0" smtClean="0"/>
+              <a:t>You can change the number of threads using the below code:-</a:t>
+            </a:r>
+          </a:p>
+          <a:p>
+            <a:endParaRPr lang="en-GB" sz="1600" dirty="0" smtClean="0"/>
+          </a:p>
+          <a:p>
+            <a:pPr marL="0" indent="0">
+              <a:buNone/>
+            </a:pPr>
+            <a:r>
+              <a:rPr lang="en-GB" sz="1400" i="1" dirty="0" err="1"/>
+              <a:t>System.setProperty</a:t>
+            </a:r>
+            <a:r>
+              <a:rPr lang="en-GB" sz="1400" i="1" dirty="0"/>
+              <a:t>("</a:t>
+            </a:r>
+            <a:r>
+              <a:rPr lang="en-GB" sz="1400" i="1" dirty="0" err="1"/>
+              <a:t>java.util.concurrent.ForkJoinPool.common.parallelism</a:t>
+            </a:r>
+            <a:r>
+              <a:rPr lang="en-GB" sz="1400" i="1" dirty="0"/>
+              <a:t>", "12");</a:t>
+            </a:r>
+            <a:endParaRPr lang="en-GB" sz="1400" i="1" dirty="0"/>
+          </a:p>
+        </p:txBody>
+      </p:sp>
+    </p:spTree>
+    <p:extLst>
+      <p:ext uri="{BB962C8B-B14F-4D97-AF65-F5344CB8AC3E}">
+        <p14:creationId xmlns:p14="http://schemas.microsoft.com/office/powerpoint/2010/main" val="1825380943"/>
+      </p:ext>
+    </p:extLst>
+  </p:cSld>
+  <p:clrMapOvr>
+    <a:masterClrMapping/>
+  </p:clrMapOvr>
+  <p:timing>
+    <p:tnLst>
+      <p:par>
+        <p:cTn id="1" dur="indefinite" restart="never" nodeType="tmRoot"/>
+      </p:par>
+    </p:tnLst>
+  </p:timing>
+</p:sld>
+</file>
+
+<file path=ppt/slides/slide12.xml><?xml version="1.0" encoding="utf-8"?>
+<p:sld xmlns:a="http://schemas.openxmlformats.org/drawingml/2006/main" xmlns:r="http://schemas.openxmlformats.org/officeDocument/2006/relationships" xmlns:p="http://schemas.openxmlformats.org/presentationml/2006/main">
+  <p:cSld>
+    <p:spTree>
+      <p:nvGrpSpPr>
+        <p:cNvPr id="1" name=""/>
+        <p:cNvGrpSpPr/>
+        <p:nvPr/>
+      </p:nvGrpSpPr>
+      <p:grpSpPr>
+        <a:xfrm>
+          <a:off x="0" y="0"/>
+          <a:ext cx="0" cy="0"/>
+          <a:chOff x="0" y="0"/>
+          <a:chExt cx="0" cy="0"/>
+        </a:xfrm>
+      </p:grpSpPr>
+      <p:sp>
+        <p:nvSpPr>
+          <p:cNvPr id="2" name="Title 1"/>
+          <p:cNvSpPr>
+            <a:spLocks noGrp="1"/>
+          </p:cNvSpPr>
+          <p:nvPr>
+            <p:ph type="title"/>
+          </p:nvPr>
+        </p:nvSpPr>
+        <p:spPr/>
+        <p:txBody>
+          <a:bodyPr>
+            <a:normAutofit/>
+          </a:bodyPr>
+          <a:lstStyle/>
+          <a:p>
+            <a:r>
+              <a:rPr lang="en-US" dirty="0" smtClean="0"/>
+              <a:t>Split Iterator</a:t>
+            </a:r>
+            <a:endParaRPr lang="en-US" dirty="0"/>
+          </a:p>
+        </p:txBody>
+      </p:sp>
+      <p:sp>
+        <p:nvSpPr>
+          <p:cNvPr id="3" name="Content Placeholder 2"/>
+          <p:cNvSpPr>
+            <a:spLocks noGrp="1"/>
+          </p:cNvSpPr>
+          <p:nvPr>
+            <p:ph idx="1"/>
+          </p:nvPr>
+        </p:nvSpPr>
+        <p:spPr/>
+        <p:txBody>
+          <a:bodyPr>
+            <a:normAutofit/>
+          </a:bodyPr>
+          <a:lstStyle/>
+          <a:p>
+            <a:r>
+              <a:rPr lang="en-GB" sz="1400" dirty="0"/>
+              <a:t>Like </a:t>
+            </a:r>
+            <a:r>
+              <a:rPr lang="en-GB" sz="1400" dirty="0"/>
+              <a:t>Iterator</a:t>
+            </a:r>
+            <a:r>
+              <a:rPr lang="en-GB" sz="1400" dirty="0"/>
+              <a:t>s, </a:t>
+            </a:r>
+            <a:r>
+              <a:rPr lang="en-GB" sz="1400" dirty="0"/>
+              <a:t>Spliterator</a:t>
+            </a:r>
+            <a:r>
+              <a:rPr lang="en-GB" sz="1400" dirty="0"/>
+              <a:t>s are used to traverse the elements of a source, but they’re also designed to do this in </a:t>
+            </a:r>
+            <a:r>
+              <a:rPr lang="en-GB" sz="1400" b="1" dirty="0" smtClean="0"/>
+              <a:t>parallel.</a:t>
+            </a:r>
+            <a:r>
+              <a:rPr lang="en-GB" sz="1400" dirty="0"/>
+              <a:t> Java 8 already provides a default </a:t>
+            </a:r>
+            <a:r>
+              <a:rPr lang="en-GB" sz="1400" dirty="0"/>
+              <a:t>Spliterator</a:t>
+            </a:r>
+            <a:r>
+              <a:rPr lang="en-GB" sz="1400" dirty="0"/>
+              <a:t> implementation for all the data structures included in its Collections </a:t>
+            </a:r>
+            <a:r>
+              <a:rPr lang="en-GB" sz="1400" dirty="0" smtClean="0"/>
+              <a:t>Framework</a:t>
+            </a:r>
+          </a:p>
+          <a:p>
+            <a:r>
+              <a:rPr lang="en-GB" sz="1400" dirty="0"/>
+              <a:t>The framework keeps invoking the method </a:t>
+            </a:r>
+            <a:r>
+              <a:rPr lang="en-GB" sz="1400" b="1" dirty="0" err="1"/>
+              <a:t>trySplit</a:t>
+            </a:r>
+            <a:r>
+              <a:rPr lang="en-GB" sz="1400" dirty="0"/>
+              <a:t> on a </a:t>
+            </a:r>
+            <a:r>
+              <a:rPr lang="en-GB" sz="1400" dirty="0"/>
+              <a:t>Spliterator</a:t>
+            </a:r>
+            <a:r>
+              <a:rPr lang="en-GB" sz="1400" dirty="0"/>
+              <a:t> until it returns </a:t>
+            </a:r>
+            <a:r>
+              <a:rPr lang="en-GB" sz="1400" dirty="0"/>
+              <a:t>null</a:t>
+            </a:r>
+            <a:r>
+              <a:rPr lang="en-GB" sz="1400" dirty="0"/>
+              <a:t> to signal that the data structure that it’s processing is no longer </a:t>
+            </a:r>
+            <a:r>
+              <a:rPr lang="en-GB" sz="1400" dirty="0" smtClean="0"/>
+              <a:t>divisible</a:t>
+            </a:r>
+          </a:p>
+          <a:p>
+            <a:r>
+              <a:rPr lang="en-GB" sz="1400" dirty="0"/>
+              <a:t>This splitting process can also be influenced by the characteristics of the </a:t>
+            </a:r>
+            <a:r>
+              <a:rPr lang="en-GB" sz="1400" dirty="0"/>
+              <a:t>Spliterator</a:t>
+            </a:r>
+            <a:r>
+              <a:rPr lang="en-GB" sz="1400" dirty="0"/>
+              <a:t> itself, which are declared via the </a:t>
+            </a:r>
+            <a:r>
+              <a:rPr lang="en-GB" sz="1400" b="1" dirty="0" smtClean="0"/>
+              <a:t>characteristics</a:t>
+            </a:r>
+            <a:r>
+              <a:rPr lang="en-GB" sz="1400" dirty="0" smtClean="0"/>
+              <a:t> method</a:t>
+            </a:r>
+          </a:p>
+          <a:p>
+            <a:endParaRPr lang="en-GB" sz="1400" b="1" i="1" dirty="0"/>
+          </a:p>
+        </p:txBody>
+      </p:sp>
+      <p:pic>
+        <p:nvPicPr>
+          <p:cNvPr id="1026" name="Picture 2"/>
+          <p:cNvPicPr>
+            <a:picLocks noChangeAspect="1" noChangeArrowheads="1"/>
+          </p:cNvPicPr>
+          <p:nvPr/>
+        </p:nvPicPr>
+        <p:blipFill>
+          <a:blip r:embed="rId2">
+            <a:extLst>
+              <a:ext uri="{28A0092B-C50C-407E-A947-70E740481C1C}">
+                <a14:useLocalDpi xmlns:a14="http://schemas.microsoft.com/office/drawing/2010/main" val="0"/>
+              </a:ext>
+            </a:extLst>
+          </a:blip>
+          <a:srcRect/>
+          <a:stretch>
+            <a:fillRect/>
+          </a:stretch>
+        </p:blipFill>
+        <p:spPr bwMode="auto">
+          <a:xfrm>
+            <a:off x="683569" y="3378530"/>
+            <a:ext cx="7848872" cy="2047875"/>
+          </a:xfrm>
+          <a:prstGeom prst="rect">
+            <a:avLst/>
+          </a:prstGeom>
+          <a:noFill/>
+          <a:ln>
+            <a:noFill/>
+          </a:ln>
+          <a:extLst>
+            <a:ext uri="{909E8E84-426E-40DD-AFC4-6F175D3DCCD1}">
+              <a14:hiddenFill xmlns:a14="http://schemas.microsoft.com/office/drawing/2010/main">
+                <a:solidFill>
+                  <a:schemeClr val="accent1"/>
+                </a:solidFill>
+              </a14:hiddenFill>
+            </a:ext>
+            <a:ext uri="{91240B29-F687-4F45-9708-019B960494DF}">
+              <a14:hiddenLine xmlns:a14="http://schemas.microsoft.com/office/drawing/2010/main" w="9525">
+                <a:solidFill>
+                  <a:schemeClr val="tx1"/>
+                </a:solidFill>
+                <a:miter lim="800000"/>
+                <a:headEnd/>
+                <a:tailEnd/>
+              </a14:hiddenLine>
+            </a:ext>
+          </a:extLst>
+        </p:spPr>
+      </p:pic>
+    </p:spTree>
+    <p:extLst>
+      <p:ext uri="{BB962C8B-B14F-4D97-AF65-F5344CB8AC3E}">
+        <p14:creationId xmlns:p14="http://schemas.microsoft.com/office/powerpoint/2010/main" val="972947957"/>
+      </p:ext>
+    </p:extLst>
+  </p:cSld>
+  <p:clrMapOvr>
+    <a:masterClrMapping/>
+  </p:clrMapOvr>
+  <p:timing>
+    <p:tnLst>
+      <p:par>
+        <p:cTn id="1" dur="indefinite" restart="never" nodeType="tmRoot"/>
+      </p:par>
+    </p:tnLst>
+  </p:timing>
+</p:sld>
+</file>
+
+<file path=ppt/slides/slide13.xml><?xml version="1.0" encoding="utf-8"?>
+<p:sld xmlns:a="http://schemas.openxmlformats.org/drawingml/2006/main" xmlns:r="http://schemas.openxmlformats.org/officeDocument/2006/relationships" xmlns:p="http://schemas.openxmlformats.org/presentationml/2006/main">
+  <p:cSld>
+    <p:spTree>
+      <p:nvGrpSpPr>
+        <p:cNvPr id="1" name=""/>
+        <p:cNvGrpSpPr/>
+        <p:nvPr/>
+      </p:nvGrpSpPr>
+      <p:grpSpPr>
+        <a:xfrm>
+          <a:off x="0" y="0"/>
+          <a:ext cx="0" cy="0"/>
+          <a:chOff x="0" y="0"/>
+          <a:chExt cx="0" cy="0"/>
+        </a:xfrm>
+      </p:grpSpPr>
+      <p:sp>
+        <p:nvSpPr>
+          <p:cNvPr id="2" name="Title 1"/>
+          <p:cNvSpPr>
+            <a:spLocks noGrp="1"/>
+          </p:cNvSpPr>
+          <p:nvPr>
+            <p:ph type="title"/>
+          </p:nvPr>
+        </p:nvSpPr>
+        <p:spPr/>
+        <p:txBody>
+          <a:bodyPr>
+            <a:normAutofit/>
+          </a:bodyPr>
+          <a:lstStyle/>
+          <a:p>
+            <a:r>
+              <a:rPr lang="en-US" dirty="0" smtClean="0"/>
+              <a:t>Vert.X</a:t>
+            </a:r>
+            <a:endParaRPr lang="en-US" dirty="0"/>
+          </a:p>
+        </p:txBody>
+      </p:sp>
+      <p:sp>
+        <p:nvSpPr>
+          <p:cNvPr id="3" name="Content Placeholder 2"/>
+          <p:cNvSpPr>
+            <a:spLocks noGrp="1"/>
+          </p:cNvSpPr>
+          <p:nvPr>
+            <p:ph idx="1"/>
+          </p:nvPr>
+        </p:nvSpPr>
+        <p:spPr/>
+        <p:txBody>
+          <a:bodyPr>
+            <a:normAutofit/>
+          </a:bodyPr>
+          <a:lstStyle/>
+          <a:p>
+            <a:r>
+              <a:rPr lang="en-GB" sz="1600" dirty="0" smtClean="0"/>
+              <a:t>Vert.X framework can be used for building non-blocking web applications</a:t>
+            </a:r>
+          </a:p>
+          <a:p>
+            <a:endParaRPr lang="en-GB" sz="1600" dirty="0"/>
+          </a:p>
+        </p:txBody>
+      </p:sp>
+    </p:spTree>
+    <p:extLst>
+      <p:ext uri="{BB962C8B-B14F-4D97-AF65-F5344CB8AC3E}">
+        <p14:creationId xmlns:p14="http://schemas.microsoft.com/office/powerpoint/2010/main" val="1004353174"/>
+      </p:ext>
+    </p:extLst>
+  </p:cSld>
+  <p:clrMapOvr>
+    <a:masterClrMapping/>
+  </p:clrMapOvr>
+  <p:timing>
+    <p:tnLst>
+      <p:par>
+        <p:cTn id="1" dur="indefinite" restart="never" nodeType="tmRoot"/>
+      </p:par>
+    </p:tnLst>
+  </p:timing>
+</p:sld>
+</file>
+
+<file path=ppt/slides/slide14.xml><?xml version="1.0" encoding="utf-8"?>
+<p:sld xmlns:a="http://schemas.openxmlformats.org/drawingml/2006/main" xmlns:r="http://schemas.openxmlformats.org/officeDocument/2006/relationships" xmlns:p="http://schemas.openxmlformats.org/presentationml/2006/main">
+  <p:cSld>
+    <p:spTree>
+      <p:nvGrpSpPr>
+        <p:cNvPr id="1" name=""/>
+        <p:cNvGrpSpPr/>
+        <p:nvPr/>
+      </p:nvGrpSpPr>
+      <p:grpSpPr>
+        <a:xfrm>
+          <a:off x="0" y="0"/>
+          <a:ext cx="0" cy="0"/>
+          <a:chOff x="0" y="0"/>
+          <a:chExt cx="0" cy="0"/>
+        </a:xfrm>
+      </p:grpSpPr>
+      <p:sp>
+        <p:nvSpPr>
+          <p:cNvPr id="2" name="Title 1"/>
+          <p:cNvSpPr>
+            <a:spLocks noGrp="1"/>
+          </p:cNvSpPr>
+          <p:nvPr>
+            <p:ph type="title"/>
+          </p:nvPr>
+        </p:nvSpPr>
+        <p:spPr/>
+        <p:txBody>
           <a:bodyPr/>
           <a:lstStyle/>
           <a:p>
@@ -3646,7 +4349,17 @@
             </a:r>
             <a:r>
               <a:rPr lang="en-US" sz="1600" dirty="0" smtClean="0"/>
-              <a:t> - Optional class</a:t>
+              <a:t> - Optional </a:t>
+            </a:r>
+            <a:r>
+              <a:rPr lang="en-US" sz="1600" dirty="0" smtClean="0"/>
+              <a:t>class</a:t>
+            </a:r>
+          </a:p>
+          <a:p>
+            <a:r>
+              <a:rPr lang="en-US" sz="1600" dirty="0"/>
+              <a:t>http://javahungry.blogspot.com/2014/04/fail-fast-iterator-vs-fail-safe-iterator-difference-with-example-in-java.html</a:t>
             </a:r>
             <a:endParaRPr lang="en-US" sz="1600" dirty="0" smtClean="0"/>
           </a:p>
@@ -4337,11 +5050,7 @@
           <a:p>
             <a:r>
               <a:rPr lang="en-US" dirty="0" smtClean="0"/>
-              <a:t>Java 8 – </a:t>
-            </a:r>
-            <a:r>
-              <a:rPr lang="en-US" dirty="0" smtClean="0"/>
-              <a:t>final class Optional</a:t>
+              <a:t>Java 8 – final class Optional</a:t>
             </a:r>
             <a:endParaRPr lang="en-US" dirty="0"/>
           </a:p>
@@ -4374,23 +5083,7 @@
             </a:r>
             <a:r>
               <a:rPr lang="en-GB" sz="1600" dirty="0"/>
-              <a:t> returns </a:t>
-            </a:r>
-            <a:r>
-              <a:rPr lang="en-GB" sz="1600" dirty="0"/>
-              <a:t>null</a:t>
-            </a:r>
-            <a:r>
-              <a:rPr lang="en-GB" sz="1600" dirty="0"/>
-              <a:t> when the key is not present in the map. This is how the maps in the Collections Framework work, even if this behavior sounds doubtful. In fact, this method cannot be used to tell whether a given key is present in a map or not. Indeed, if this key has been associated with a null value (this is certainly not something you should do!), the call to </a:t>
-            </a:r>
-            <a:r>
-              <a:rPr lang="en-GB" sz="1600" dirty="0"/>
-              <a:t>map.get(key)</a:t>
-            </a:r>
-            <a:r>
-              <a:rPr lang="en-GB" sz="1600" dirty="0"/>
-              <a:t> will also return </a:t>
+              <a:t> returns null when the key is not present in the map. This is how the maps in the Collections Framework work, even if this behavior sounds doubtful. In fact, this method cannot be used to tell whether a given key is present in a map or not. Indeed, if this key has been associated with a null value (this is certainly not something you should do!), the call to map.get(key) will also return </a:t>
             </a:r>
             <a:r>
               <a:rPr lang="en-GB" sz="1600" dirty="0" smtClean="0"/>
@@ -4423,11 +5116,7 @@
           <a:p>
             <a:r>
               <a:rPr lang="en-GB" sz="1400" dirty="0"/>
-              <a:t>Optional</a:t>
-            </a:r>
-            <a:r>
-              <a:rPr lang="en-GB" sz="1400" dirty="0"/>
-              <a:t> is a final class with a private </a:t>
+              <a:t>Optional is a final class with a private </a:t>
             </a:r>
             <a:r>
               <a:rPr lang="en-GB" sz="1400" dirty="0" smtClean="0"/>
@@ -4461,15 +5150,7 @@
             </a:r>
             <a:r>
               <a:rPr lang="en-GB" sz="1400" dirty="0"/>
-              <a:t>As an argument, it takes an object that should not be null. If we pass a null object to this method, we will get a </a:t>
-            </a:r>
-            <a:r>
-              <a:rPr lang="en-GB" sz="1400" dirty="0"/>
-              <a:t>NullPointerException</a:t>
-            </a:r>
-            <a:r>
-              <a:rPr lang="en-GB" sz="1400" dirty="0"/>
-              <a:t>. This method can be used to wrap any non‐null object in an </a:t>
+              <a:t>As an argument, it takes an object that should not be null. If we pass a null object to this method, we will get a NullPointerException. This method can be used to wrap any non‐null object in an </a:t>
             </a:r>
             <a:r>
               <a:rPr lang="en-GB" sz="1400" dirty="0" smtClean="0"/>
@@ -5059,7 +5740,7 @@
           <a:p>
             <a:r>
               <a:rPr lang="en-US" dirty="0" smtClean="0"/>
-              <a:t>Vert.X</a:t>
+              <a:t>Fail Fast and Fail Safe Iterator</a:t>
             </a:r>
             <a:endParaRPr lang="en-US" dirty="0"/>
           </a:p>
@@ -5078,17 +5759,193 @@
         <p:spPr/>
         <p:txBody>
           <a:bodyPr>
-            <a:normAutofit/>
+            <a:normAutofit fontScale="92500" lnSpcReduction="10000"/>
           </a:bodyPr>
           <a:lstStyle/>
           <a:p>
             <a:r>
+              <a:rPr lang="en-GB" sz="1600" b="1" dirty="0" smtClean="0"/>
+              <a:t>Concurrent Modification:-</a:t>
+            </a:r>
+          </a:p>
+          <a:p>
+            <a:pPr marL="0" indent="0">
+              <a:buNone/>
+            </a:pPr>
+            <a:r>
               <a:rPr lang="en-GB" sz="1600" dirty="0" smtClean="0"/>
-              <a:t>Vert.X framework can be used for building non-blocking web applications</a:t>
+              <a:t>When </a:t>
+            </a:r>
+            <a:r>
+              <a:rPr lang="en-GB" sz="1600" dirty="0"/>
+              <a:t>one or more thread is iterating over the collection, in between, one thread changes the structure of the </a:t>
+            </a:r>
+            <a:r>
+              <a:rPr lang="en-GB" sz="1600" dirty="0" smtClean="0"/>
+              <a:t>collection is known as </a:t>
+            </a:r>
+            <a:r>
+              <a:rPr lang="en-GB" sz="1600" dirty="0"/>
+              <a:t>Concurrent </a:t>
+            </a:r>
+            <a:r>
+              <a:rPr lang="en-GB" sz="1600" dirty="0" smtClean="0"/>
+              <a:t>Modification.</a:t>
+            </a:r>
+          </a:p>
+          <a:p>
+            <a:r>
+              <a:rPr lang="en-GB" sz="1600" b="1" dirty="0"/>
+              <a:t>Fail fast </a:t>
+            </a:r>
+            <a:r>
+              <a:rPr lang="en-GB" sz="1600" b="1" dirty="0" smtClean="0"/>
+              <a:t>Iterator:-</a:t>
+            </a:r>
+          </a:p>
+          <a:p>
+            <a:pPr marL="0" indent="0">
+              <a:buNone/>
+            </a:pPr>
+            <a:r>
+              <a:rPr lang="en-GB" sz="1600" dirty="0"/>
+              <a:t>Fail fast iterator while iterating through the collection , instantly throws Concurrent Modification Exception if there is structural modification  of the collection . Thus, in the face of concurrent modification, the iterator fails quickly and cleanly, rather than risking arbitrary, non-deterministic </a:t>
+            </a:r>
+            <a:r>
+              <a:rPr lang="en-GB" sz="1600" dirty="0" err="1"/>
+              <a:t>behavior</a:t>
+            </a:r>
+            <a:r>
+              <a:rPr lang="en-GB" sz="1600" dirty="0"/>
+              <a:t> at an undetermined time in the future. </a:t>
+            </a:r>
+            <a:r>
+              <a:rPr lang="en-GB" sz="1600" dirty="0"/>
+              <a:t/>
+            </a:r>
+            <a:br>
+              <a:rPr lang="en-GB" sz="1600" dirty="0"/>
+            </a:br>
+            <a:r>
+              <a:rPr lang="en-GB" sz="1600" dirty="0"/>
+              <a:t/>
+            </a:r>
+            <a:br>
+              <a:rPr lang="en-GB" sz="1600" dirty="0"/>
+            </a:br>
+            <a:r>
+              <a:rPr lang="en-GB" sz="1600" dirty="0"/>
+              <a:t>Fail-fast iterator can throw ConcurrentModificationException in two scenarios :</a:t>
             </a:r>
             <a:endParaRPr lang="en-GB" sz="1600" dirty="0" smtClean="0"/>
           </a:p>
           <a:p>
+            <a:pPr marL="0" indent="0">
+              <a:buNone/>
+            </a:pPr>
+            <a:endParaRPr lang="en-GB" sz="1600" i="1" dirty="0" smtClean="0"/>
+          </a:p>
+          <a:p>
+            <a:pPr marL="0" indent="0">
+              <a:buNone/>
+            </a:pPr>
+            <a:r>
+              <a:rPr lang="en-GB" sz="1600" b="1" i="1" dirty="0" smtClean="0"/>
+              <a:t>Single </a:t>
+            </a:r>
+            <a:r>
+              <a:rPr lang="en-GB" sz="1600" b="1" i="1" dirty="0"/>
+              <a:t>Threaded </a:t>
+            </a:r>
+            <a:r>
+              <a:rPr lang="en-GB" sz="1600" b="1" i="1" dirty="0" smtClean="0"/>
+              <a:t>Environment:-</a:t>
+            </a:r>
+            <a:r>
+              <a:rPr lang="en-GB" sz="1600" dirty="0"/>
+              <a:t/>
+            </a:r>
+            <a:br>
+              <a:rPr lang="en-GB" sz="1600" dirty="0"/>
+            </a:br>
+            <a:r>
+              <a:rPr lang="en-GB" sz="1600" i="1" dirty="0"/>
+              <a:t> </a:t>
+            </a:r>
+            <a:r>
+              <a:rPr lang="en-GB" sz="1600" dirty="0"/>
+              <a:t> </a:t>
+            </a:r>
+            <a:r>
+              <a:rPr lang="en-GB" sz="1600" dirty="0"/>
+              <a:t/>
+            </a:r>
+            <a:br>
+              <a:rPr lang="en-GB" sz="1600" dirty="0"/>
+            </a:br>
+            <a:r>
+              <a:rPr lang="en-GB" sz="1600" dirty="0"/>
+              <a:t>After the creation of the iterator , structure is modified at any time by any method other than iterator's own remove method. </a:t>
+            </a:r>
+            <a:r>
+              <a:rPr lang="en-GB" sz="1600" dirty="0"/>
+              <a:t/>
+            </a:r>
+            <a:br>
+              <a:rPr lang="en-GB" sz="1600" dirty="0"/>
+            </a:br>
+            <a:r>
+              <a:rPr lang="en-GB" sz="1600" dirty="0"/>
+              <a:t> </a:t>
+            </a:r>
+            <a:r>
+              <a:rPr lang="en-GB" sz="1600" i="1" dirty="0"/>
+              <a:t> </a:t>
+            </a:r>
+            <a:r>
+              <a:rPr lang="en-GB" sz="1600" dirty="0"/>
+              <a:t/>
+            </a:r>
+            <a:br>
+              <a:rPr lang="en-GB" sz="1600" dirty="0"/>
+            </a:br>
+            <a:r>
+              <a:rPr lang="en-GB" sz="1600" b="1" i="1" dirty="0"/>
+              <a:t>Multiple Threaded </a:t>
+            </a:r>
+            <a:r>
+              <a:rPr lang="en-GB" sz="1600" b="1" i="1" dirty="0" smtClean="0"/>
+              <a:t>Environment:-</a:t>
+            </a:r>
+            <a:r>
+              <a:rPr lang="en-GB" sz="1600" dirty="0"/>
+              <a:t/>
+            </a:r>
+            <a:br>
+              <a:rPr lang="en-GB" sz="1600" dirty="0"/>
+            </a:br>
+            <a:r>
+              <a:rPr lang="en-GB" sz="1600" dirty="0"/>
+              <a:t/>
+            </a:r>
+            <a:br>
+              <a:rPr lang="en-GB" sz="1600" dirty="0"/>
+            </a:br>
+            <a:r>
+              <a:rPr lang="en-GB" sz="1600" dirty="0"/>
+              <a:t> If one thread is modifying the structure of the collection while other thread is iterating over </a:t>
+            </a:r>
+            <a:r>
+              <a:rPr lang="en-GB" sz="1600" dirty="0" smtClean="0"/>
+              <a:t>it.</a:t>
+            </a:r>
+            <a:r>
+              <a:rPr lang="en-GB" sz="1600" dirty="0"/>
+              <a:t/>
+            </a:r>
+            <a:br>
+              <a:rPr lang="en-GB" sz="1600" dirty="0"/>
+            </a:br>
             <a:endParaRPr lang="en-GB" sz="1600" dirty="0"/>
           </a:p>
         </p:txBody>

</xml_diff>

<commit_message>
fail fast concurrent modification exception
</commit_message>
<xml_diff>
--- a/Java8.pptx
+++ b/Java8.pptx
@@ -19,8 +19,9 @@
     <p:sldId id="309" r:id="rId13"/>
     <p:sldId id="306" r:id="rId14"/>
     <p:sldId id="311" r:id="rId15"/>
-    <p:sldId id="310" r:id="rId16"/>
-    <p:sldId id="269" r:id="rId17"/>
+    <p:sldId id="312" r:id="rId16"/>
+    <p:sldId id="310" r:id="rId17"/>
+    <p:sldId id="269" r:id="rId18"/>
   </p:sldIdLst>
   <p:sldSz cx="9144000" cy="6858000" type="screen4x3"/>
   <p:notesSz cx="6858000" cy="9144000"/>
@@ -310,7 +311,7 @@
           <a:p>
             <a:fld id="{8F235549-BF0A-4B98-8561-3786244E808C}" type="datetimeFigureOut">
               <a:rPr lang="en-US" smtClean="0"/>
-              <a:t>5/31/2017</a:t>
+              <a:t>11/29/2017</a:t>
             </a:fld>
             <a:endParaRPr lang="en-US"/>
           </a:p>
@@ -510,7 +511,7 @@
           <a:p>
             <a:fld id="{8F235549-BF0A-4B98-8561-3786244E808C}" type="datetimeFigureOut">
               <a:rPr lang="en-US" smtClean="0"/>
-              <a:t>5/31/2017</a:t>
+              <a:t>11/29/2017</a:t>
             </a:fld>
             <a:endParaRPr lang="en-US"/>
           </a:p>
@@ -685,7 +686,7 @@
           <a:p>
             <a:fld id="{8F235549-BF0A-4B98-8561-3786244E808C}" type="datetimeFigureOut">
               <a:rPr lang="en-US" smtClean="0"/>
-              <a:t>5/31/2017</a:t>
+              <a:t>11/29/2017</a:t>
             </a:fld>
             <a:endParaRPr lang="en-US"/>
           </a:p>
@@ -850,7 +851,7 @@
           <a:p>
             <a:fld id="{8F235549-BF0A-4B98-8561-3786244E808C}" type="datetimeFigureOut">
               <a:rPr lang="en-US" smtClean="0"/>
-              <a:t>5/31/2017</a:t>
+              <a:t>11/29/2017</a:t>
             </a:fld>
             <a:endParaRPr lang="en-US"/>
           </a:p>
@@ -1098,7 +1099,7 @@
           <a:p>
             <a:fld id="{8F235549-BF0A-4B98-8561-3786244E808C}" type="datetimeFigureOut">
               <a:rPr lang="en-US" smtClean="0"/>
-              <a:t>5/31/2017</a:t>
+              <a:t>11/29/2017</a:t>
             </a:fld>
             <a:endParaRPr lang="en-US"/>
           </a:p>
@@ -1416,7 +1417,7 @@
           <a:p>
             <a:fld id="{8F235549-BF0A-4B98-8561-3786244E808C}" type="datetimeFigureOut">
               <a:rPr lang="en-US" smtClean="0"/>
-              <a:t>5/31/2017</a:t>
+              <a:t>11/29/2017</a:t>
             </a:fld>
             <a:endParaRPr lang="en-US"/>
           </a:p>
@@ -1882,7 +1883,7 @@
           <a:p>
             <a:fld id="{8F235549-BF0A-4B98-8561-3786244E808C}" type="datetimeFigureOut">
               <a:rPr lang="en-US" smtClean="0"/>
-              <a:t>5/31/2017</a:t>
+              <a:t>11/29/2017</a:t>
             </a:fld>
             <a:endParaRPr lang="en-US"/>
           </a:p>
@@ -2030,7 +2031,7 @@
           <a:p>
             <a:fld id="{8F235549-BF0A-4B98-8561-3786244E808C}" type="datetimeFigureOut">
               <a:rPr lang="en-US" smtClean="0"/>
-              <a:t>5/31/2017</a:t>
+              <a:t>11/29/2017</a:t>
             </a:fld>
             <a:endParaRPr lang="en-US"/>
           </a:p>
@@ -2120,7 +2121,7 @@
           <a:p>
             <a:fld id="{8F235549-BF0A-4B98-8561-3786244E808C}" type="datetimeFigureOut">
               <a:rPr lang="en-US" smtClean="0"/>
-              <a:t>5/31/2017</a:t>
+              <a:t>11/29/2017</a:t>
             </a:fld>
             <a:endParaRPr lang="en-US"/>
           </a:p>
@@ -2394,7 +2395,7 @@
           <a:p>
             <a:fld id="{8F235549-BF0A-4B98-8561-3786244E808C}" type="datetimeFigureOut">
               <a:rPr lang="en-US" smtClean="0"/>
-              <a:t>5/31/2017</a:t>
+              <a:t>11/29/2017</a:t>
             </a:fld>
             <a:endParaRPr lang="en-US"/>
           </a:p>
@@ -2699,7 +2700,7 @@
           <a:p>
             <a:fld id="{8F235549-BF0A-4B98-8561-3786244E808C}" type="datetimeFigureOut">
               <a:rPr lang="en-US" smtClean="0"/>
-              <a:t>5/31/2017</a:t>
+              <a:t>11/29/2017</a:t>
             </a:fld>
             <a:endParaRPr lang="en-US"/>
           </a:p>
@@ -2997,7 +2998,7 @@
           <a:p>
             <a:fld id="{8F235549-BF0A-4B98-8561-3786244E808C}" type="datetimeFigureOut">
               <a:rPr lang="en-US" smtClean="0"/>
-              <a:t>5/31/2017</a:t>
+              <a:t>11/29/2017</a:t>
             </a:fld>
             <a:endParaRPr lang="en-US"/>
           </a:p>
@@ -4090,7 +4091,6 @@
               <a:rPr lang="en-GB" sz="1600" dirty="0" smtClean="0"/>
               <a:t>is used to avoid Null Pointer Exception in Java</a:t>
             </a:r>
-            <a:endParaRPr lang="en-GB" sz="1600" dirty="0" smtClean="0"/>
           </a:p>
           <a:p>
             <a:endParaRPr lang="en-GB" sz="1600" dirty="0"/>
@@ -4272,6 +4272,152 @@
           <a:p>
             <a:r>
               <a:rPr lang="en-US" dirty="0" smtClean="0"/>
+              <a:t>Flatmap() – Eagerly Loaded</a:t>
+            </a:r>
+            <a:endParaRPr lang="en-US" dirty="0"/>
+          </a:p>
+        </p:txBody>
+      </p:sp>
+      <p:sp>
+        <p:nvSpPr>
+          <p:cNvPr id="3" name="Content Placeholder 2"/>
+          <p:cNvSpPr>
+            <a:spLocks noGrp="1"/>
+          </p:cNvSpPr>
+          <p:nvPr>
+            <p:ph idx="1"/>
+          </p:nvPr>
+        </p:nvSpPr>
+        <p:spPr/>
+        <p:txBody>
+          <a:bodyPr>
+            <a:normAutofit/>
+          </a:bodyPr>
+          <a:lstStyle/>
+          <a:p>
+            <a:r>
+              <a:rPr lang="en-GB" sz="1600" b="1" dirty="0"/>
+              <a:t>Laziness-seeking</a:t>
+            </a:r>
+            <a:r>
+              <a:rPr lang="en-GB" sz="1600" dirty="0"/>
+              <a:t>. Many stream operations, such as filtering, mapping, or duplicate removal, can be implemented lazily, exposing opportunities for optimization. For example, "find the first String with three consecutive vowels" need not examine all the input strings. Stream operations are divided into intermediate (Stream-producing) operations and terminal (value- or side-effect-producing) operations. Intermediate operations are always lazy</a:t>
+            </a:r>
+            <a:r>
+              <a:rPr lang="en-GB" sz="1600" dirty="0" smtClean="0"/>
+              <a:t>.</a:t>
+            </a:r>
+          </a:p>
+          <a:p>
+            <a:r>
+              <a:rPr lang="en-GB" sz="1600" dirty="0" smtClean="0"/>
+              <a:t>However, the </a:t>
+            </a:r>
+            <a:r>
+              <a:rPr lang="en-GB" sz="1600" b="1" dirty="0" err="1" smtClean="0">
+                <a:solidFill>
+                  <a:srgbClr val="00CC66"/>
+                </a:solidFill>
+              </a:rPr>
+              <a:t>flatMap</a:t>
+            </a:r>
+            <a:r>
+              <a:rPr lang="en-GB" sz="1600" b="1" dirty="0" smtClean="0">
+                <a:solidFill>
+                  <a:srgbClr val="00CC66"/>
+                </a:solidFill>
+              </a:rPr>
+              <a:t>()</a:t>
+            </a:r>
+            <a:r>
+              <a:rPr lang="en-GB" sz="1600" dirty="0" smtClean="0">
+                <a:solidFill>
+                  <a:srgbClr val="00CC66"/>
+                </a:solidFill>
+              </a:rPr>
+              <a:t> </a:t>
+            </a:r>
+            <a:r>
+              <a:rPr lang="en-GB" sz="1600" dirty="0" smtClean="0"/>
+              <a:t>is eagerly loaded. You can experience the result if you have </a:t>
+            </a:r>
+            <a:r>
+              <a:rPr lang="en-GB" sz="1600" dirty="0" err="1" smtClean="0"/>
+              <a:t>flatMap</a:t>
+            </a:r>
+            <a:r>
+              <a:rPr lang="en-GB" sz="1600" dirty="0" smtClean="0"/>
+              <a:t>() in the middle</a:t>
+            </a:r>
+          </a:p>
+          <a:p>
+            <a:r>
+              <a:rPr lang="en-GB" sz="1600" dirty="0" smtClean="0"/>
+              <a:t>So, better </a:t>
+            </a:r>
+            <a:r>
+              <a:rPr lang="en-GB" sz="1600" dirty="0"/>
+              <a:t>filter them first. And map later.</a:t>
+            </a:r>
+          </a:p>
+        </p:txBody>
+      </p:sp>
+    </p:spTree>
+    <p:extLst>
+      <p:ext uri="{BB962C8B-B14F-4D97-AF65-F5344CB8AC3E}">
+        <p14:creationId xmlns:p14="http://schemas.microsoft.com/office/powerpoint/2010/main" val="4210158429"/>
+      </p:ext>
+    </p:extLst>
+  </p:cSld>
+  <p:clrMapOvr>
+    <a:masterClrMapping/>
+  </p:clrMapOvr>
+  <p:timing>
+    <p:tnLst>
+      <p:par>
+        <p:cTn id="1" dur="indefinite" restart="never" nodeType="tmRoot"/>
+      </p:par>
+    </p:tnLst>
+  </p:timing>
+</p:sld>
+</file>
+
+<file path=ppt/slides/slide16.xml><?xml version="1.0" encoding="utf-8"?>
+<p:sld xmlns:a="http://schemas.openxmlformats.org/drawingml/2006/main" xmlns:r="http://schemas.openxmlformats.org/officeDocument/2006/relationships" xmlns:p="http://schemas.openxmlformats.org/presentationml/2006/main">
+  <p:cSld>
+    <p:spTree>
+      <p:nvGrpSpPr>
+        <p:cNvPr id="1" name=""/>
+        <p:cNvGrpSpPr/>
+        <p:nvPr/>
+      </p:nvGrpSpPr>
+      <p:grpSpPr>
+        <a:xfrm>
+          <a:off x="0" y="0"/>
+          <a:ext cx="0" cy="0"/>
+          <a:chOff x="0" y="0"/>
+          <a:chExt cx="0" cy="0"/>
+        </a:xfrm>
+      </p:grpSpPr>
+      <p:sp>
+        <p:nvSpPr>
+          <p:cNvPr id="2" name="Title 1"/>
+          <p:cNvSpPr>
+            <a:spLocks noGrp="1"/>
+          </p:cNvSpPr>
+          <p:nvPr>
+            <p:ph type="title"/>
+          </p:nvPr>
+        </p:nvSpPr>
+        <p:spPr/>
+        <p:txBody>
+          <a:bodyPr>
+            <a:normAutofit/>
+          </a:bodyPr>
+          <a:lstStyle/>
+          <a:p>
+            <a:r>
+              <a:rPr lang="en-US" dirty="0" smtClean="0"/>
               <a:t>Vert.X</a:t>
             </a:r>
             <a:endParaRPr lang="en-US" dirty="0"/>
@@ -4325,7 +4471,7 @@
 </p:sld>
 </file>
 
-<file path=ppt/slides/slide16.xml><?xml version="1.0" encoding="utf-8"?>
+<file path=ppt/slides/slide17.xml><?xml version="1.0" encoding="utf-8"?>
 <p:sld xmlns:a="http://schemas.openxmlformats.org/drawingml/2006/main" xmlns:r="http://schemas.openxmlformats.org/officeDocument/2006/relationships" xmlns:p="http://schemas.openxmlformats.org/presentationml/2006/main">
   <p:cSld>
     <p:spTree>
@@ -6018,7 +6164,27 @@
             </a:br>
             <a:r>
               <a:rPr lang="en-GB" sz="1600" dirty="0"/>
-              <a:t>Fail-fast iterator can throw ConcurrentModificationException in two scenarios :</a:t>
+              <a:t>Fail-fast iterator can throw </a:t>
+            </a:r>
+            <a:r>
+              <a:rPr lang="en-GB" sz="1600" b="1" dirty="0">
+                <a:solidFill>
+                  <a:srgbClr val="FF0000"/>
+                </a:solidFill>
+              </a:rPr>
+              <a:t>ConcurrentModificationException</a:t>
+            </a:r>
+            <a:r>
+              <a:rPr lang="en-GB" sz="1600" dirty="0">
+                <a:solidFill>
+                  <a:srgbClr val="FF0000"/>
+                </a:solidFill>
+              </a:rPr>
+              <a:t> </a:t>
+            </a:r>
+            <a:r>
+              <a:rPr lang="en-GB" sz="1600" dirty="0"/>
+              <a:t>in two scenarios :</a:t>
             </a:r>
             <a:endParaRPr lang="en-GB" sz="1600" dirty="0" smtClean="0"/>
           </a:p>

</xml_diff>

<commit_message>
Functional Interface SAM rule
</commit_message>
<xml_diff>
--- a/Java8.pptx
+++ b/Java8.pptx
@@ -23,8 +23,9 @@
     <p:sldId id="313" r:id="rId17"/>
     <p:sldId id="314" r:id="rId18"/>
     <p:sldId id="315" r:id="rId19"/>
-    <p:sldId id="310" r:id="rId20"/>
-    <p:sldId id="269" r:id="rId21"/>
+    <p:sldId id="316" r:id="rId20"/>
+    <p:sldId id="310" r:id="rId21"/>
+    <p:sldId id="269" r:id="rId22"/>
   </p:sldIdLst>
   <p:sldSz cx="9144000" cy="6858000" type="screen4x3"/>
   <p:notesSz cx="6858000" cy="9144000"/>
@@ -314,7 +315,7 @@
           <a:p>
             <a:fld id="{8F235549-BF0A-4B98-8561-3786244E808C}" type="datetimeFigureOut">
               <a:rPr lang="en-US" smtClean="0"/>
-              <a:t>2/3/2018</a:t>
+              <a:t>3/6/2018</a:t>
             </a:fld>
             <a:endParaRPr lang="en-US"/>
           </a:p>
@@ -514,7 +515,7 @@
           <a:p>
             <a:fld id="{8F235549-BF0A-4B98-8561-3786244E808C}" type="datetimeFigureOut">
               <a:rPr lang="en-US" smtClean="0"/>
-              <a:t>2/3/2018</a:t>
+              <a:t>3/6/2018</a:t>
             </a:fld>
             <a:endParaRPr lang="en-US"/>
           </a:p>
@@ -689,7 +690,7 @@
           <a:p>
             <a:fld id="{8F235549-BF0A-4B98-8561-3786244E808C}" type="datetimeFigureOut">
               <a:rPr lang="en-US" smtClean="0"/>
-              <a:t>2/3/2018</a:t>
+              <a:t>3/6/2018</a:t>
             </a:fld>
             <a:endParaRPr lang="en-US"/>
           </a:p>
@@ -854,7 +855,7 @@
           <a:p>
             <a:fld id="{8F235549-BF0A-4B98-8561-3786244E808C}" type="datetimeFigureOut">
               <a:rPr lang="en-US" smtClean="0"/>
-              <a:t>2/3/2018</a:t>
+              <a:t>3/6/2018</a:t>
             </a:fld>
             <a:endParaRPr lang="en-US"/>
           </a:p>
@@ -1102,7 +1103,7 @@
           <a:p>
             <a:fld id="{8F235549-BF0A-4B98-8561-3786244E808C}" type="datetimeFigureOut">
               <a:rPr lang="en-US" smtClean="0"/>
-              <a:t>2/3/2018</a:t>
+              <a:t>3/6/2018</a:t>
             </a:fld>
             <a:endParaRPr lang="en-US"/>
           </a:p>
@@ -1420,7 +1421,7 @@
           <a:p>
             <a:fld id="{8F235549-BF0A-4B98-8561-3786244E808C}" type="datetimeFigureOut">
               <a:rPr lang="en-US" smtClean="0"/>
-              <a:t>2/3/2018</a:t>
+              <a:t>3/6/2018</a:t>
             </a:fld>
             <a:endParaRPr lang="en-US"/>
           </a:p>
@@ -1886,7 +1887,7 @@
           <a:p>
             <a:fld id="{8F235549-BF0A-4B98-8561-3786244E808C}" type="datetimeFigureOut">
               <a:rPr lang="en-US" smtClean="0"/>
-              <a:t>2/3/2018</a:t>
+              <a:t>3/6/2018</a:t>
             </a:fld>
             <a:endParaRPr lang="en-US"/>
           </a:p>
@@ -2034,7 +2035,7 @@
           <a:p>
             <a:fld id="{8F235549-BF0A-4B98-8561-3786244E808C}" type="datetimeFigureOut">
               <a:rPr lang="en-US" smtClean="0"/>
-              <a:t>2/3/2018</a:t>
+              <a:t>3/6/2018</a:t>
             </a:fld>
             <a:endParaRPr lang="en-US"/>
           </a:p>
@@ -2124,7 +2125,7 @@
           <a:p>
             <a:fld id="{8F235549-BF0A-4B98-8561-3786244E808C}" type="datetimeFigureOut">
               <a:rPr lang="en-US" smtClean="0"/>
-              <a:t>2/3/2018</a:t>
+              <a:t>3/6/2018</a:t>
             </a:fld>
             <a:endParaRPr lang="en-US"/>
           </a:p>
@@ -2398,7 +2399,7 @@
           <a:p>
             <a:fld id="{8F235549-BF0A-4B98-8561-3786244E808C}" type="datetimeFigureOut">
               <a:rPr lang="en-US" smtClean="0"/>
-              <a:t>2/3/2018</a:t>
+              <a:t>3/6/2018</a:t>
             </a:fld>
             <a:endParaRPr lang="en-US"/>
           </a:p>
@@ -2703,7 +2704,7 @@
           <a:p>
             <a:fld id="{8F235549-BF0A-4B98-8561-3786244E808C}" type="datetimeFigureOut">
               <a:rPr lang="en-US" smtClean="0"/>
-              <a:t>2/3/2018</a:t>
+              <a:t>3/6/2018</a:t>
             </a:fld>
             <a:endParaRPr lang="en-US"/>
           </a:p>
@@ -3001,7 +3002,7 @@
           <a:p>
             <a:fld id="{8F235549-BF0A-4B98-8561-3786244E808C}" type="datetimeFigureOut">
               <a:rPr lang="en-US" smtClean="0"/>
-              <a:t>2/3/2018</a:t>
+              <a:t>3/6/2018</a:t>
             </a:fld>
             <a:endParaRPr lang="en-US"/>
           </a:p>
@@ -4687,7 +4688,6 @@
               <a:rPr lang="en-GB" sz="1200" dirty="0" smtClean="0"/>
               <a:t>Code reuse</a:t>
             </a:r>
-            <a:endParaRPr lang="en-GB" sz="1200" dirty="0" smtClean="0"/>
           </a:p>
           <a:p>
             <a:r>
@@ -4949,7 +4949,7 @@
           <a:p>
             <a:r>
               <a:rPr lang="en-US" dirty="0" smtClean="0"/>
-              <a:t>Vert.X</a:t>
+              <a:t>Functional Interface</a:t>
             </a:r>
             <a:endParaRPr lang="en-US" dirty="0"/>
           </a:p>
@@ -4973,11 +4973,39 @@
           <a:lstStyle/>
           <a:p>
             <a:r>
+              <a:rPr lang="en-GB" sz="1600" dirty="0"/>
+              <a:t>Any interface with a</a:t>
+            </a:r>
+            <a:r>
+              <a:rPr lang="en-GB" sz="1600" b="1" dirty="0"/>
+              <a:t> SAM(Single Abstract Method) </a:t>
+            </a:r>
+            <a:r>
+              <a:rPr lang="en-GB" sz="1600" dirty="0"/>
+              <a:t>is a functional interface, and its implementation may be treated as lambda </a:t>
+            </a:r>
+            <a:r>
               <a:rPr lang="en-GB" sz="1600" dirty="0" smtClean="0"/>
-              <a:t>Vert.X framework can be used for building non-blocking web applications</a:t>
-            </a:r>
-          </a:p>
-          <a:p>
+              <a:t>expressions</a:t>
+            </a:r>
+          </a:p>
+          <a:p>
+            <a:r>
+              <a:rPr lang="en-GB" sz="1600" dirty="0" smtClean="0"/>
+              <a:t>Functional interface </a:t>
+            </a:r>
+            <a:r>
+              <a:rPr lang="en-GB" sz="1600" b="1" dirty="0" smtClean="0">
+                <a:solidFill>
+                  <a:srgbClr val="FF0000"/>
+                </a:solidFill>
+              </a:rPr>
+              <a:t>cannot have default method </a:t>
+            </a:r>
+            <a:r>
+              <a:rPr lang="en-GB" sz="1600" dirty="0" smtClean="0"/>
+              <a:t>as it has some implementation</a:t>
+            </a:r>
             <a:endParaRPr lang="en-GB" sz="1600" dirty="0"/>
           </a:p>
         </p:txBody>
@@ -4985,7 +5013,7 @@
     </p:spTree>
     <p:extLst>
       <p:ext uri="{BB962C8B-B14F-4D97-AF65-F5344CB8AC3E}">
-        <p14:creationId xmlns:p14="http://schemas.microsoft.com/office/powerpoint/2010/main" val="670452719"/>
+        <p14:creationId xmlns:p14="http://schemas.microsoft.com/office/powerpoint/2010/main" val="2340965457"/>
       </p:ext>
     </p:extLst>
   </p:cSld>
@@ -5110,6 +5138,95 @@
 </file>
 
 <file path=ppt/slides/slide20.xml><?xml version="1.0" encoding="utf-8"?>
+<p:sld xmlns:a="http://schemas.openxmlformats.org/drawingml/2006/main" xmlns:r="http://schemas.openxmlformats.org/officeDocument/2006/relationships" xmlns:p="http://schemas.openxmlformats.org/presentationml/2006/main">
+  <p:cSld>
+    <p:spTree>
+      <p:nvGrpSpPr>
+        <p:cNvPr id="1" name=""/>
+        <p:cNvGrpSpPr/>
+        <p:nvPr/>
+      </p:nvGrpSpPr>
+      <p:grpSpPr>
+        <a:xfrm>
+          <a:off x="0" y="0"/>
+          <a:ext cx="0" cy="0"/>
+          <a:chOff x="0" y="0"/>
+          <a:chExt cx="0" cy="0"/>
+        </a:xfrm>
+      </p:grpSpPr>
+      <p:sp>
+        <p:nvSpPr>
+          <p:cNvPr id="2" name="Title 1"/>
+          <p:cNvSpPr>
+            <a:spLocks noGrp="1"/>
+          </p:cNvSpPr>
+          <p:nvPr>
+            <p:ph type="title"/>
+          </p:nvPr>
+        </p:nvSpPr>
+        <p:spPr/>
+        <p:txBody>
+          <a:bodyPr>
+            <a:normAutofit/>
+          </a:bodyPr>
+          <a:lstStyle/>
+          <a:p>
+            <a:r>
+              <a:rPr lang="en-US" dirty="0" smtClean="0"/>
+              <a:t>Vert.X</a:t>
+            </a:r>
+            <a:endParaRPr lang="en-US" dirty="0"/>
+          </a:p>
+        </p:txBody>
+      </p:sp>
+      <p:sp>
+        <p:nvSpPr>
+          <p:cNvPr id="3" name="Content Placeholder 2"/>
+          <p:cNvSpPr>
+            <a:spLocks noGrp="1"/>
+          </p:cNvSpPr>
+          <p:nvPr>
+            <p:ph idx="1"/>
+          </p:nvPr>
+        </p:nvSpPr>
+        <p:spPr/>
+        <p:txBody>
+          <a:bodyPr>
+            <a:normAutofit/>
+          </a:bodyPr>
+          <a:lstStyle/>
+          <a:p>
+            <a:r>
+              <a:rPr lang="en-GB" sz="1600" dirty="0" smtClean="0"/>
+              <a:t>Vert.X framework can be used for building non-blocking web applications</a:t>
+            </a:r>
+          </a:p>
+          <a:p>
+            <a:endParaRPr lang="en-GB" sz="1600" dirty="0"/>
+          </a:p>
+        </p:txBody>
+      </p:sp>
+    </p:spTree>
+    <p:extLst>
+      <p:ext uri="{BB962C8B-B14F-4D97-AF65-F5344CB8AC3E}">
+        <p14:creationId xmlns:p14="http://schemas.microsoft.com/office/powerpoint/2010/main" val="670452719"/>
+      </p:ext>
+    </p:extLst>
+  </p:cSld>
+  <p:clrMapOvr>
+    <a:masterClrMapping/>
+  </p:clrMapOvr>
+  <p:timing>
+    <p:tnLst>
+      <p:par>
+        <p:cTn id="1" dur="indefinite" restart="never" nodeType="tmRoot"/>
+      </p:par>
+    </p:tnLst>
+  </p:timing>
+</p:sld>
+</file>
+
+<file path=ppt/slides/slide21.xml><?xml version="1.0" encoding="utf-8"?>
 <p:sld xmlns:a="http://schemas.openxmlformats.org/drawingml/2006/main" xmlns:r="http://schemas.openxmlformats.org/officeDocument/2006/relationships" xmlns:p="http://schemas.openxmlformats.org/presentationml/2006/main">
   <p:cSld>
     <p:spTree>
@@ -6523,23 +6640,23 @@
               <a:t>non-capturing</a:t>
             </a:r>
             <a:r>
-              <a:rPr lang="en-GB" sz="1600" b="1"/>
+              <a:rPr lang="en-GB" sz="1600" b="1" dirty="0"/>
               <a:t>:</a:t>
             </a:r>
             <a:r>
-              <a:rPr lang="en-GB" sz="1600"/>
+              <a:rPr lang="en-GB" sz="1600" dirty="0"/>
               <a:t> T</a:t>
             </a:r>
             <a:r>
-              <a:rPr lang="en-GB" sz="1600" smtClean="0"/>
+              <a:rPr lang="en-GB" sz="1600" dirty="0" smtClean="0"/>
               <a:t>he </a:t>
             </a:r>
             <a:r>
-              <a:rPr lang="en-GB" sz="1600"/>
+              <a:rPr lang="en-GB" sz="1600" dirty="0"/>
               <a:t>lambda accesses variables defined outside its </a:t>
             </a:r>
             <a:r>
-              <a:rPr lang="en-GB" sz="1600" smtClean="0"/>
+              <a:rPr lang="en-GB" sz="1600" dirty="0" smtClean="0"/>
               <a:t>body</a:t>
             </a:r>
           </a:p>

</xml_diff>